<commit_message>
Added runtime drawers/RuntimesDrawer.java Changed how Q and V are updated (before: single error signal, after: separate error signals) WTable now gets erased after each episode Modified number of replay episodes and learning rate on xml file Changed affordance biases so that biases are booleans
</commit_message>
<xml_diff>
--- a/multiscalemodel/src/edu/usf/ratsim/model/morris_replay/logging/issues.pptx
+++ b/multiscalemodel/src/edu/usf/ratsim/model/morris_replay/logging/issues.pptx
@@ -11,7 +11,8 @@
     <p:sldId id="259" r:id="rId5"/>
     <p:sldId id="260" r:id="rId6"/>
     <p:sldId id="262" r:id="rId7"/>
-    <p:sldId id="261" r:id="rId8"/>
+    <p:sldId id="263" r:id="rId8"/>
+    <p:sldId id="261" r:id="rId9"/>
   </p:sldIdLst>
   <p:sldSz cx="12192000" cy="6858000"/>
   <p:notesSz cx="6858000" cy="9144000"/>
@@ -17791,8 +17792,8 @@
           </a:p>
         </p:txBody>
       </p:sp>
-      <mc:AlternateContent xmlns:mc="http://schemas.openxmlformats.org/markup-compatibility/2006">
-        <mc:Choice xmlns:a14="http://schemas.microsoft.com/office/drawing/2010/main" Requires="a14">
+      <mc:AlternateContent xmlns:mc="http://schemas.openxmlformats.org/markup-compatibility/2006" xmlns:a14="http://schemas.microsoft.com/office/drawing/2010/main">
+        <mc:Choice Requires="a14">
           <p:sp>
             <p:nvSpPr>
               <p:cNvPr id="243" name="TextBox 242">
@@ -17866,7 +17867,7 @@
             </p:txBody>
           </p:sp>
         </mc:Choice>
-        <mc:Fallback>
+        <mc:Fallback xmlns="">
           <p:sp>
             <p:nvSpPr>
               <p:cNvPr id="243" name="TextBox 242">
@@ -17916,8 +17917,8 @@
           </p:sp>
         </mc:Fallback>
       </mc:AlternateContent>
-      <mc:AlternateContent xmlns:mc="http://schemas.openxmlformats.org/markup-compatibility/2006">
-        <mc:Choice xmlns:a14="http://schemas.microsoft.com/office/drawing/2010/main" Requires="a14">
+      <mc:AlternateContent xmlns:mc="http://schemas.openxmlformats.org/markup-compatibility/2006" xmlns:a14="http://schemas.microsoft.com/office/drawing/2010/main">
+        <mc:Choice Requires="a14">
           <p:sp>
             <p:nvSpPr>
               <p:cNvPr id="244" name="TextBox 243">
@@ -18017,7 +18018,7 @@
             </p:txBody>
           </p:sp>
         </mc:Choice>
-        <mc:Fallback>
+        <mc:Fallback xmlns="">
           <p:sp>
             <p:nvSpPr>
               <p:cNvPr id="244" name="TextBox 243">
@@ -18067,8 +18068,8 @@
           </p:sp>
         </mc:Fallback>
       </mc:AlternateContent>
-      <mc:AlternateContent xmlns:mc="http://schemas.openxmlformats.org/markup-compatibility/2006">
-        <mc:Choice xmlns:a14="http://schemas.microsoft.com/office/drawing/2010/main" Requires="a14">
+      <mc:AlternateContent xmlns:mc="http://schemas.openxmlformats.org/markup-compatibility/2006" xmlns:a14="http://schemas.microsoft.com/office/drawing/2010/main">
+        <mc:Choice Requires="a14">
           <p:sp>
             <p:nvSpPr>
               <p:cNvPr id="245" name="TextBox 244">
@@ -18175,7 +18176,7 @@
             </p:txBody>
           </p:sp>
         </mc:Choice>
-        <mc:Fallback>
+        <mc:Fallback xmlns="">
           <p:sp>
             <p:nvSpPr>
               <p:cNvPr id="245" name="TextBox 244">
@@ -18226,8 +18227,8 @@
           </p:sp>
         </mc:Fallback>
       </mc:AlternateContent>
-      <mc:AlternateContent xmlns:mc="http://schemas.openxmlformats.org/markup-compatibility/2006">
-        <mc:Choice xmlns:a14="http://schemas.microsoft.com/office/drawing/2010/main" Requires="a14">
+      <mc:AlternateContent xmlns:mc="http://schemas.openxmlformats.org/markup-compatibility/2006" xmlns:a14="http://schemas.microsoft.com/office/drawing/2010/main">
+        <mc:Choice Requires="a14">
           <p:sp>
             <p:nvSpPr>
               <p:cNvPr id="246" name="TextBox 245">
@@ -18344,7 +18345,7 @@
             </p:txBody>
           </p:sp>
         </mc:Choice>
-        <mc:Fallback>
+        <mc:Fallback xmlns="">
           <p:sp>
             <p:nvSpPr>
               <p:cNvPr id="246" name="TextBox 245">
@@ -18395,8 +18396,8 @@
           </p:sp>
         </mc:Fallback>
       </mc:AlternateContent>
-      <mc:AlternateContent xmlns:mc="http://schemas.openxmlformats.org/markup-compatibility/2006">
-        <mc:Choice xmlns:a14="http://schemas.microsoft.com/office/drawing/2010/main" Requires="a14">
+      <mc:AlternateContent xmlns:mc="http://schemas.openxmlformats.org/markup-compatibility/2006" xmlns:a14="http://schemas.microsoft.com/office/drawing/2010/main">
+        <mc:Choice Requires="a14">
           <p:sp>
             <p:nvSpPr>
               <p:cNvPr id="247" name="TextBox 246">
@@ -18497,7 +18498,7 @@
             </p:txBody>
           </p:sp>
         </mc:Choice>
-        <mc:Fallback>
+        <mc:Fallback xmlns="">
           <p:sp>
             <p:nvSpPr>
               <p:cNvPr id="247" name="TextBox 246">
@@ -18547,8 +18548,8 @@
           </p:sp>
         </mc:Fallback>
       </mc:AlternateContent>
-      <mc:AlternateContent xmlns:mc="http://schemas.openxmlformats.org/markup-compatibility/2006">
-        <mc:Choice xmlns:a14="http://schemas.microsoft.com/office/drawing/2010/main" Requires="a14">
+      <mc:AlternateContent xmlns:mc="http://schemas.openxmlformats.org/markup-compatibility/2006" xmlns:a14="http://schemas.microsoft.com/office/drawing/2010/main">
+        <mc:Choice Requires="a14">
           <p:sp>
             <p:nvSpPr>
               <p:cNvPr id="248" name="TextBox 247">
@@ -18680,7 +18681,7 @@
             </p:txBody>
           </p:sp>
         </mc:Choice>
-        <mc:Fallback>
+        <mc:Fallback xmlns="">
           <p:sp>
             <p:nvSpPr>
               <p:cNvPr id="248" name="TextBox 247">
@@ -18730,8 +18731,8 @@
           </p:sp>
         </mc:Fallback>
       </mc:AlternateContent>
-      <mc:AlternateContent xmlns:mc="http://schemas.openxmlformats.org/markup-compatibility/2006">
-        <mc:Choice xmlns:a14="http://schemas.microsoft.com/office/drawing/2010/main" Requires="a14">
+      <mc:AlternateContent xmlns:mc="http://schemas.openxmlformats.org/markup-compatibility/2006" xmlns:a14="http://schemas.microsoft.com/office/drawing/2010/main">
+        <mc:Choice Requires="a14">
           <p:sp>
             <p:nvSpPr>
               <p:cNvPr id="249" name="TextBox 248">
@@ -18817,7 +18818,7 @@
             </p:txBody>
           </p:sp>
         </mc:Choice>
-        <mc:Fallback>
+        <mc:Fallback xmlns="">
           <p:sp>
             <p:nvSpPr>
               <p:cNvPr id="249" name="TextBox 248">
@@ -18867,8 +18868,8 @@
           </p:sp>
         </mc:Fallback>
       </mc:AlternateContent>
-      <mc:AlternateContent xmlns:mc="http://schemas.openxmlformats.org/markup-compatibility/2006">
-        <mc:Choice xmlns:a14="http://schemas.microsoft.com/office/drawing/2010/main" Requires="a14">
+      <mc:AlternateContent xmlns:mc="http://schemas.openxmlformats.org/markup-compatibility/2006" xmlns:a14="http://schemas.microsoft.com/office/drawing/2010/main">
+        <mc:Choice Requires="a14">
           <p:sp>
             <p:nvSpPr>
               <p:cNvPr id="250" name="TextBox 249">
@@ -18948,7 +18949,7 @@
             </p:txBody>
           </p:sp>
         </mc:Choice>
-        <mc:Fallback>
+        <mc:Fallback xmlns="">
           <p:sp>
             <p:nvSpPr>
               <p:cNvPr id="250" name="TextBox 249">
@@ -18998,8 +18999,8 @@
           </p:sp>
         </mc:Fallback>
       </mc:AlternateContent>
-      <mc:AlternateContent xmlns:mc="http://schemas.openxmlformats.org/markup-compatibility/2006">
-        <mc:Choice xmlns:a14="http://schemas.microsoft.com/office/drawing/2010/main" Requires="a14">
+      <mc:AlternateContent xmlns:mc="http://schemas.openxmlformats.org/markup-compatibility/2006" xmlns:a14="http://schemas.microsoft.com/office/drawing/2010/main">
+        <mc:Choice Requires="a14">
           <p:sp>
             <p:nvSpPr>
               <p:cNvPr id="251" name="TextBox 250">
@@ -19079,7 +19080,7 @@
             </p:txBody>
           </p:sp>
         </mc:Choice>
-        <mc:Fallback>
+        <mc:Fallback xmlns="">
           <p:sp>
             <p:nvSpPr>
               <p:cNvPr id="251" name="TextBox 250">
@@ -19129,8 +19130,8 @@
           </p:sp>
         </mc:Fallback>
       </mc:AlternateContent>
-      <mc:AlternateContent xmlns:mc="http://schemas.openxmlformats.org/markup-compatibility/2006">
-        <mc:Choice xmlns:a14="http://schemas.microsoft.com/office/drawing/2010/main" Requires="a14">
+      <mc:AlternateContent xmlns:mc="http://schemas.openxmlformats.org/markup-compatibility/2006" xmlns:a14="http://schemas.microsoft.com/office/drawing/2010/main">
+        <mc:Choice Requires="a14">
           <p:sp>
             <p:nvSpPr>
               <p:cNvPr id="252" name="TextBox 251">
@@ -19194,7 +19195,7 @@
             </p:txBody>
           </p:sp>
         </mc:Choice>
-        <mc:Fallback>
+        <mc:Fallback xmlns="">
           <p:sp>
             <p:nvSpPr>
               <p:cNvPr id="252" name="TextBox 251">
@@ -19680,8 +19681,8 @@
           </a:p>
         </p:txBody>
       </p:sp>
-      <mc:AlternateContent xmlns:mc="http://schemas.openxmlformats.org/markup-compatibility/2006">
-        <mc:Choice xmlns:a14="http://schemas.microsoft.com/office/drawing/2010/main" Requires="a14">
+      <mc:AlternateContent xmlns:mc="http://schemas.openxmlformats.org/markup-compatibility/2006" xmlns:a14="http://schemas.microsoft.com/office/drawing/2010/main">
+        <mc:Choice Requires="a14">
           <p:sp>
             <p:nvSpPr>
               <p:cNvPr id="263" name="TextBox 262">
@@ -19755,7 +19756,7 @@
             </p:txBody>
           </p:sp>
         </mc:Choice>
-        <mc:Fallback>
+        <mc:Fallback xmlns="">
           <p:sp>
             <p:nvSpPr>
               <p:cNvPr id="263" name="TextBox 262">
@@ -20367,8 +20368,8 @@
           </a:fontRef>
         </p:style>
       </p:cxnSp>
-      <mc:AlternateContent xmlns:mc="http://schemas.openxmlformats.org/markup-compatibility/2006">
-        <mc:Choice xmlns:a14="http://schemas.microsoft.com/office/drawing/2010/main" Requires="a14">
+      <mc:AlternateContent xmlns:mc="http://schemas.openxmlformats.org/markup-compatibility/2006" xmlns:a14="http://schemas.microsoft.com/office/drawing/2010/main">
+        <mc:Choice Requires="a14">
           <p:sp>
             <p:nvSpPr>
               <p:cNvPr id="277" name="TextBox 276">
@@ -20463,7 +20464,7 @@
             </p:txBody>
           </p:sp>
         </mc:Choice>
-        <mc:Fallback>
+        <mc:Fallback xmlns="">
           <p:sp>
             <p:nvSpPr>
               <p:cNvPr id="277" name="TextBox 276">
@@ -20514,8 +20515,8 @@
           </p:sp>
         </mc:Fallback>
       </mc:AlternateContent>
-      <mc:AlternateContent xmlns:mc="http://schemas.openxmlformats.org/markup-compatibility/2006">
-        <mc:Choice xmlns:a14="http://schemas.microsoft.com/office/drawing/2010/main" Requires="a14">
+      <mc:AlternateContent xmlns:mc="http://schemas.openxmlformats.org/markup-compatibility/2006" xmlns:a14="http://schemas.microsoft.com/office/drawing/2010/main">
+        <mc:Choice Requires="a14">
           <p:sp>
             <p:nvSpPr>
               <p:cNvPr id="278" name="TextBox 277">
@@ -20610,7 +20611,7 @@
             </p:txBody>
           </p:sp>
         </mc:Choice>
-        <mc:Fallback>
+        <mc:Fallback xmlns="">
           <p:sp>
             <p:nvSpPr>
               <p:cNvPr id="278" name="TextBox 277">
@@ -20704,8 +20705,8 @@
           </a:fontRef>
         </p:style>
       </p:cxnSp>
-      <mc:AlternateContent xmlns:mc="http://schemas.openxmlformats.org/markup-compatibility/2006">
-        <mc:Choice xmlns:a14="http://schemas.microsoft.com/office/drawing/2010/main" Requires="a14">
+      <mc:AlternateContent xmlns:mc="http://schemas.openxmlformats.org/markup-compatibility/2006" xmlns:a14="http://schemas.microsoft.com/office/drawing/2010/main">
+        <mc:Choice Requires="a14">
           <p:sp>
             <p:nvSpPr>
               <p:cNvPr id="280" name="TextBox 279">
@@ -20806,7 +20807,7 @@
             </p:txBody>
           </p:sp>
         </mc:Choice>
-        <mc:Fallback>
+        <mc:Fallback xmlns="">
           <p:sp>
             <p:nvSpPr>
               <p:cNvPr id="280" name="TextBox 279">
@@ -20988,8 +20989,8 @@
           </a:fontRef>
         </p:style>
       </p:cxnSp>
-      <mc:AlternateContent xmlns:mc="http://schemas.openxmlformats.org/markup-compatibility/2006">
-        <mc:Choice xmlns:a14="http://schemas.microsoft.com/office/drawing/2010/main" Requires="a14">
+      <mc:AlternateContent xmlns:mc="http://schemas.openxmlformats.org/markup-compatibility/2006" xmlns:a14="http://schemas.microsoft.com/office/drawing/2010/main">
+        <mc:Choice Requires="a14">
           <p:sp>
             <p:nvSpPr>
               <p:cNvPr id="325" name="TextBox 324">
@@ -21096,7 +21097,7 @@
             </p:txBody>
           </p:sp>
         </mc:Choice>
-        <mc:Fallback>
+        <mc:Fallback xmlns="">
           <p:sp>
             <p:nvSpPr>
               <p:cNvPr id="325" name="TextBox 324">
@@ -21193,8 +21194,8 @@
           </a:fontRef>
         </p:style>
       </p:cxnSp>
-      <mc:AlternateContent xmlns:mc="http://schemas.openxmlformats.org/markup-compatibility/2006">
-        <mc:Choice xmlns:a14="http://schemas.microsoft.com/office/drawing/2010/main" Requires="a14">
+      <mc:AlternateContent xmlns:mc="http://schemas.openxmlformats.org/markup-compatibility/2006" xmlns:a14="http://schemas.microsoft.com/office/drawing/2010/main">
+        <mc:Choice Requires="a14">
           <p:sp>
             <p:nvSpPr>
               <p:cNvPr id="335" name="TextBox 334">
@@ -21317,7 +21318,7 @@
             </p:txBody>
           </p:sp>
         </mc:Choice>
-        <mc:Fallback>
+        <mc:Fallback xmlns="">
           <p:sp>
             <p:nvSpPr>
               <p:cNvPr id="335" name="TextBox 334">
@@ -21710,6 +21711,208 @@
 </file>
 
 <file path=ppt/slides/slide7.xml><?xml version="1.0" encoding="utf-8"?>
+<p:sld xmlns:a="http://schemas.openxmlformats.org/drawingml/2006/main" xmlns:r="http://schemas.openxmlformats.org/officeDocument/2006/relationships" xmlns:p="http://schemas.openxmlformats.org/presentationml/2006/main">
+  <p:cSld>
+    <p:spTree>
+      <p:nvGrpSpPr>
+        <p:cNvPr id="1" name=""/>
+        <p:cNvGrpSpPr/>
+        <p:nvPr/>
+      </p:nvGrpSpPr>
+      <p:grpSpPr>
+        <a:xfrm>
+          <a:off x="0" y="0"/>
+          <a:ext cx="0" cy="0"/>
+          <a:chOff x="0" y="0"/>
+          <a:chExt cx="0" cy="0"/>
+        </a:xfrm>
+      </p:grpSpPr>
+      <p:sp>
+        <p:nvSpPr>
+          <p:cNvPr id="3" name="Content Placeholder 2">
+            <a:extLst>
+              <a:ext uri="{FF2B5EF4-FFF2-40B4-BE49-F238E27FC236}">
+                <a16:creationId xmlns:a16="http://schemas.microsoft.com/office/drawing/2014/main" id="{FB080C32-5C6D-4680-809D-EB1E99F8F5F7}"/>
+              </a:ext>
+            </a:extLst>
+          </p:cNvPr>
+          <p:cNvSpPr>
+            <a:spLocks noGrp="1"/>
+          </p:cNvSpPr>
+          <p:nvPr>
+            <p:ph idx="1"/>
+          </p:nvPr>
+        </p:nvSpPr>
+        <p:spPr/>
+        <p:txBody>
+          <a:bodyPr/>
+          <a:lstStyle/>
+          <a:p>
+            <a:endParaRPr lang="en-US"/>
+          </a:p>
+        </p:txBody>
+      </p:sp>
+      <p:pic>
+        <p:nvPicPr>
+          <p:cNvPr id="4" name="Picture 3">
+            <a:extLst>
+              <a:ext uri="{FF2B5EF4-FFF2-40B4-BE49-F238E27FC236}">
+                <a16:creationId xmlns:a16="http://schemas.microsoft.com/office/drawing/2014/main" id="{1BE3D0E4-C2CB-45A3-94C1-0DA5658C55A2}"/>
+              </a:ext>
+            </a:extLst>
+          </p:cNvPr>
+          <p:cNvPicPr>
+            <a:picLocks noChangeAspect="1"/>
+          </p:cNvPicPr>
+          <p:nvPr/>
+        </p:nvPicPr>
+        <p:blipFill>
+          <a:blip r:embed="rId2"/>
+          <a:stretch>
+            <a:fillRect/>
+          </a:stretch>
+        </p:blipFill>
+        <p:spPr>
+          <a:xfrm>
+            <a:off x="1328467" y="1883443"/>
+            <a:ext cx="8508353" cy="4609432"/>
+          </a:xfrm>
+          <a:prstGeom prst="rect">
+            <a:avLst/>
+          </a:prstGeom>
+        </p:spPr>
+      </p:pic>
+      <p:sp>
+        <p:nvSpPr>
+          <p:cNvPr id="5" name="Title 1">
+            <a:extLst>
+              <a:ext uri="{FF2B5EF4-FFF2-40B4-BE49-F238E27FC236}">
+                <a16:creationId xmlns:a16="http://schemas.microsoft.com/office/drawing/2014/main" id="{83EB3E82-1171-44AB-8F4F-90321C5E363C}"/>
+              </a:ext>
+            </a:extLst>
+          </p:cNvPr>
+          <p:cNvSpPr>
+            <a:spLocks noGrp="1"/>
+          </p:cNvSpPr>
+          <p:nvPr>
+            <p:ph type="title"/>
+          </p:nvPr>
+        </p:nvSpPr>
+        <p:spPr>
+          <a:xfrm>
+            <a:off x="838200" y="365125"/>
+            <a:ext cx="10515600" cy="1325563"/>
+          </a:xfrm>
+        </p:spPr>
+        <p:txBody>
+          <a:bodyPr>
+            <a:normAutofit fontScale="90000"/>
+          </a:bodyPr>
+          <a:lstStyle/>
+          <a:p>
+            <a:r>
+              <a:rPr lang="en-US" sz="2400" dirty="0"/>
+              <a:t>Issue 4 – For better performance HD cells are required, otherwise it is difficult to distinguish between different scenarios. Take for example the point near the food, that point may end up having a preference for all directions since Radial basis functions generalize the policy value to all vicinity.</a:t>
+            </a:r>
+          </a:p>
+        </p:txBody>
+      </p:sp>
+      <p:cxnSp>
+        <p:nvCxnSpPr>
+          <p:cNvPr id="7" name="Straight Arrow Connector 6">
+            <a:extLst>
+              <a:ext uri="{FF2B5EF4-FFF2-40B4-BE49-F238E27FC236}">
+                <a16:creationId xmlns:a16="http://schemas.microsoft.com/office/drawing/2014/main" id="{7603C0BC-3753-4B8D-84E5-DCD552CA6CB7}"/>
+              </a:ext>
+            </a:extLst>
+          </p:cNvPr>
+          <p:cNvCxnSpPr>
+            <a:cxnSpLocks/>
+          </p:cNvCxnSpPr>
+          <p:nvPr/>
+        </p:nvCxnSpPr>
+        <p:spPr>
+          <a:xfrm>
+            <a:off x="2165230" y="1607105"/>
+            <a:ext cx="0" cy="980820"/>
+          </a:xfrm>
+          <a:prstGeom prst="straightConnector1">
+            <a:avLst/>
+          </a:prstGeom>
+          <a:ln w="69850">
+            <a:tailEnd type="triangle"/>
+          </a:ln>
+        </p:spPr>
+        <p:style>
+          <a:lnRef idx="1">
+            <a:schemeClr val="accent1"/>
+          </a:lnRef>
+          <a:fillRef idx="0">
+            <a:schemeClr val="accent1"/>
+          </a:fillRef>
+          <a:effectRef idx="0">
+            <a:schemeClr val="accent1"/>
+          </a:effectRef>
+          <a:fontRef idx="minor">
+            <a:schemeClr val="tx1"/>
+          </a:fontRef>
+        </p:style>
+      </p:cxnSp>
+      <p:cxnSp>
+        <p:nvCxnSpPr>
+          <p:cNvPr id="10" name="Straight Arrow Connector 9">
+            <a:extLst>
+              <a:ext uri="{FF2B5EF4-FFF2-40B4-BE49-F238E27FC236}">
+                <a16:creationId xmlns:a16="http://schemas.microsoft.com/office/drawing/2014/main" id="{36B47610-B3C2-4E3D-81FE-5A1747934FC7}"/>
+              </a:ext>
+            </a:extLst>
+          </p:cNvPr>
+          <p:cNvCxnSpPr>
+            <a:cxnSpLocks/>
+          </p:cNvCxnSpPr>
+          <p:nvPr/>
+        </p:nvCxnSpPr>
+        <p:spPr>
+          <a:xfrm>
+            <a:off x="2294626" y="1607105"/>
+            <a:ext cx="4986068" cy="1299997"/>
+          </a:xfrm>
+          <a:prstGeom prst="straightConnector1">
+            <a:avLst/>
+          </a:prstGeom>
+          <a:ln w="69850">
+            <a:tailEnd type="triangle"/>
+          </a:ln>
+        </p:spPr>
+        <p:style>
+          <a:lnRef idx="1">
+            <a:schemeClr val="accent1"/>
+          </a:lnRef>
+          <a:fillRef idx="0">
+            <a:schemeClr val="accent1"/>
+          </a:fillRef>
+          <a:effectRef idx="0">
+            <a:schemeClr val="accent1"/>
+          </a:effectRef>
+          <a:fontRef idx="minor">
+            <a:schemeClr val="tx1"/>
+          </a:fontRef>
+        </p:style>
+      </p:cxnSp>
+    </p:spTree>
+    <p:extLst>
+      <p:ext uri="{BB962C8B-B14F-4D97-AF65-F5344CB8AC3E}">
+        <p14:creationId xmlns:p14="http://schemas.microsoft.com/office/powerpoint/2010/main" val="2287479354"/>
+      </p:ext>
+    </p:extLst>
+  </p:cSld>
+  <p:clrMapOvr>
+    <a:masterClrMapping/>
+  </p:clrMapOvr>
+</p:sld>
+</file>
+
+<file path=ppt/slides/slide8.xml><?xml version="1.0" encoding="utf-8"?>
 <p:sld xmlns:a="http://schemas.openxmlformats.org/drawingml/2006/main" xmlns:r="http://schemas.openxmlformats.org/officeDocument/2006/relationships" xmlns:p="http://schemas.openxmlformats.org/presentationml/2006/main">
   <p:cSld>
     <p:spTree>

</xml_diff>

<commit_message>
Fixed issue when loading:   -running after loading did not result in same execution   -error was action selection was storing the old random stream instead of using the new stream after load
Issue 6 found on morris_replay model.
  -plotting is too slow, so when running 1000 episodes, threads clog the system.
</commit_message>
<xml_diff>
--- a/multiscalemodel/src/edu/usf/ratsim/model/morris_replay/logging/issues.pptx
+++ b/multiscalemodel/src/edu/usf/ratsim/model/morris_replay/logging/issues.pptx
@@ -13,6 +13,7 @@
     <p:sldId id="262" r:id="rId7"/>
     <p:sldId id="263" r:id="rId8"/>
     <p:sldId id="261" r:id="rId9"/>
+    <p:sldId id="264" r:id="rId10"/>
   </p:sldIdLst>
   <p:sldSz cx="12192000" cy="6858000"/>
   <p:notesSz cx="6858000" cy="9144000"/>
@@ -266,7 +267,7 @@
           <a:p>
             <a:fld id="{2DC27D8E-51E4-4162-86B4-7AB8E00F03B0}" type="datetimeFigureOut">
               <a:rPr lang="en-US" smtClean="0"/>
-              <a:t>7/10/2018</a:t>
+              <a:t>7/11/2018</a:t>
             </a:fld>
             <a:endParaRPr lang="en-US"/>
           </a:p>
@@ -464,7 +465,7 @@
           <a:p>
             <a:fld id="{2DC27D8E-51E4-4162-86B4-7AB8E00F03B0}" type="datetimeFigureOut">
               <a:rPr lang="en-US" smtClean="0"/>
-              <a:t>7/10/2018</a:t>
+              <a:t>7/11/2018</a:t>
             </a:fld>
             <a:endParaRPr lang="en-US"/>
           </a:p>
@@ -672,7 +673,7 @@
           <a:p>
             <a:fld id="{2DC27D8E-51E4-4162-86B4-7AB8E00F03B0}" type="datetimeFigureOut">
               <a:rPr lang="en-US" smtClean="0"/>
-              <a:t>7/10/2018</a:t>
+              <a:t>7/11/2018</a:t>
             </a:fld>
             <a:endParaRPr lang="en-US"/>
           </a:p>
@@ -870,7 +871,7 @@
           <a:p>
             <a:fld id="{2DC27D8E-51E4-4162-86B4-7AB8E00F03B0}" type="datetimeFigureOut">
               <a:rPr lang="en-US" smtClean="0"/>
-              <a:t>7/10/2018</a:t>
+              <a:t>7/11/2018</a:t>
             </a:fld>
             <a:endParaRPr lang="en-US"/>
           </a:p>
@@ -1145,7 +1146,7 @@
           <a:p>
             <a:fld id="{2DC27D8E-51E4-4162-86B4-7AB8E00F03B0}" type="datetimeFigureOut">
               <a:rPr lang="en-US" smtClean="0"/>
-              <a:t>7/10/2018</a:t>
+              <a:t>7/11/2018</a:t>
             </a:fld>
             <a:endParaRPr lang="en-US"/>
           </a:p>
@@ -1410,7 +1411,7 @@
           <a:p>
             <a:fld id="{2DC27D8E-51E4-4162-86B4-7AB8E00F03B0}" type="datetimeFigureOut">
               <a:rPr lang="en-US" smtClean="0"/>
-              <a:t>7/10/2018</a:t>
+              <a:t>7/11/2018</a:t>
             </a:fld>
             <a:endParaRPr lang="en-US"/>
           </a:p>
@@ -1822,7 +1823,7 @@
           <a:p>
             <a:fld id="{2DC27D8E-51E4-4162-86B4-7AB8E00F03B0}" type="datetimeFigureOut">
               <a:rPr lang="en-US" smtClean="0"/>
-              <a:t>7/10/2018</a:t>
+              <a:t>7/11/2018</a:t>
             </a:fld>
             <a:endParaRPr lang="en-US"/>
           </a:p>
@@ -1963,7 +1964,7 @@
           <a:p>
             <a:fld id="{2DC27D8E-51E4-4162-86B4-7AB8E00F03B0}" type="datetimeFigureOut">
               <a:rPr lang="en-US" smtClean="0"/>
-              <a:t>7/10/2018</a:t>
+              <a:t>7/11/2018</a:t>
             </a:fld>
             <a:endParaRPr lang="en-US"/>
           </a:p>
@@ -2076,7 +2077,7 @@
           <a:p>
             <a:fld id="{2DC27D8E-51E4-4162-86B4-7AB8E00F03B0}" type="datetimeFigureOut">
               <a:rPr lang="en-US" smtClean="0"/>
-              <a:t>7/10/2018</a:t>
+              <a:t>7/11/2018</a:t>
             </a:fld>
             <a:endParaRPr lang="en-US"/>
           </a:p>
@@ -2387,7 +2388,7 @@
           <a:p>
             <a:fld id="{2DC27D8E-51E4-4162-86B4-7AB8E00F03B0}" type="datetimeFigureOut">
               <a:rPr lang="en-US" smtClean="0"/>
-              <a:t>7/10/2018</a:t>
+              <a:t>7/11/2018</a:t>
             </a:fld>
             <a:endParaRPr lang="en-US"/>
           </a:p>
@@ -2675,7 +2676,7 @@
           <a:p>
             <a:fld id="{2DC27D8E-51E4-4162-86B4-7AB8E00F03B0}" type="datetimeFigureOut">
               <a:rPr lang="en-US" smtClean="0"/>
-              <a:t>7/10/2018</a:t>
+              <a:t>7/11/2018</a:t>
             </a:fld>
             <a:endParaRPr lang="en-US"/>
           </a:p>
@@ -2916,7 +2917,7 @@
           <a:p>
             <a:fld id="{2DC27D8E-51E4-4162-86B4-7AB8E00F03B0}" type="datetimeFigureOut">
               <a:rPr lang="en-US" smtClean="0"/>
-              <a:t>7/10/2018</a:t>
+              <a:t>7/11/2018</a:t>
             </a:fld>
             <a:endParaRPr lang="en-US"/>
           </a:p>
@@ -21929,10 +21930,318 @@
           <a:chExt cx="0" cy="0"/>
         </a:xfrm>
       </p:grpSpPr>
+      <p:pic>
+        <p:nvPicPr>
+          <p:cNvPr id="5" name="Picture 4">
+            <a:extLst>
+              <a:ext uri="{FF2B5EF4-FFF2-40B4-BE49-F238E27FC236}">
+                <a16:creationId xmlns:a16="http://schemas.microsoft.com/office/drawing/2014/main" id="{E4A03D9F-7214-48A1-9AEE-EC3A73777711}"/>
+              </a:ext>
+            </a:extLst>
+          </p:cNvPr>
+          <p:cNvPicPr>
+            <a:picLocks noChangeAspect="1"/>
+          </p:cNvPicPr>
+          <p:nvPr/>
+        </p:nvPicPr>
+        <p:blipFill>
+          <a:blip r:embed="rId2"/>
+          <a:stretch>
+            <a:fillRect/>
+          </a:stretch>
+        </p:blipFill>
+        <p:spPr>
+          <a:xfrm>
+            <a:off x="263824" y="1429044"/>
+            <a:ext cx="11664351" cy="3173436"/>
+          </a:xfrm>
+          <a:prstGeom prst="rect">
+            <a:avLst/>
+          </a:prstGeom>
+        </p:spPr>
+      </p:pic>
+      <p:sp>
+        <p:nvSpPr>
+          <p:cNvPr id="2" name="Title 1">
+            <a:extLst>
+              <a:ext uri="{FF2B5EF4-FFF2-40B4-BE49-F238E27FC236}">
+                <a16:creationId xmlns:a16="http://schemas.microsoft.com/office/drawing/2014/main" id="{22A11268-C10D-4CF9-84BE-160B8EB6E289}"/>
+              </a:ext>
+            </a:extLst>
+          </p:cNvPr>
+          <p:cNvSpPr>
+            <a:spLocks noGrp="1"/>
+          </p:cNvSpPr>
+          <p:nvPr>
+            <p:ph type="title"/>
+          </p:nvPr>
+        </p:nvSpPr>
+        <p:spPr>
+          <a:xfrm>
+            <a:off x="838200" y="365125"/>
+            <a:ext cx="10515600" cy="1325563"/>
+          </a:xfrm>
+        </p:spPr>
+        <p:txBody>
+          <a:bodyPr>
+            <a:normAutofit fontScale="90000"/>
+          </a:bodyPr>
+          <a:lstStyle/>
+          <a:p>
+            <a:r>
+              <a:rPr lang="en-US" sz="2400" dirty="0"/>
+              <a:t>Skipped issue 5 – Matrix update equation, see log</a:t>
+            </a:r>
+            <a:br>
+              <a:rPr lang="en-US" sz="2400" dirty="0"/>
+            </a:br>
+            <a:r>
+              <a:rPr lang="en-US" sz="2400" dirty="0"/>
+              <a:t>Issue 6 – When running in async mode speed at which threads are created is bigger than speed at which they are closed. See following profiler data plots:</a:t>
+            </a:r>
+            <a:br>
+              <a:rPr lang="en-US" sz="2400" dirty="0"/>
+            </a:br>
+            <a:r>
+              <a:rPr lang="en-US" sz="2400" dirty="0"/>
+              <a:t>Cause: plotters and loggers</a:t>
+            </a:r>
+            <a:br>
+              <a:rPr lang="en-US" sz="2400" dirty="0"/>
+            </a:br>
+            <a:endParaRPr lang="en-US" sz="2400" dirty="0"/>
+          </a:p>
+        </p:txBody>
+      </p:sp>
+      <p:pic>
+        <p:nvPicPr>
+          <p:cNvPr id="4" name="Picture 3">
+            <a:extLst>
+              <a:ext uri="{FF2B5EF4-FFF2-40B4-BE49-F238E27FC236}">
+                <a16:creationId xmlns:a16="http://schemas.microsoft.com/office/drawing/2014/main" id="{43D59247-E8FB-434A-8D41-D97170DDE978}"/>
+              </a:ext>
+            </a:extLst>
+          </p:cNvPr>
+          <p:cNvPicPr>
+            <a:picLocks noChangeAspect="1"/>
+          </p:cNvPicPr>
+          <p:nvPr/>
+        </p:nvPicPr>
+        <p:blipFill>
+          <a:blip r:embed="rId3"/>
+          <a:stretch>
+            <a:fillRect/>
+          </a:stretch>
+        </p:blipFill>
+        <p:spPr>
+          <a:xfrm>
+            <a:off x="4267144" y="3033613"/>
+            <a:ext cx="7661031" cy="3824387"/>
+          </a:xfrm>
+          <a:prstGeom prst="rect">
+            <a:avLst/>
+          </a:prstGeom>
+        </p:spPr>
+      </p:pic>
+      <p:sp>
+        <p:nvSpPr>
+          <p:cNvPr id="6" name="Title 1">
+            <a:extLst>
+              <a:ext uri="{FF2B5EF4-FFF2-40B4-BE49-F238E27FC236}">
+                <a16:creationId xmlns:a16="http://schemas.microsoft.com/office/drawing/2014/main" id="{66726E51-4DEF-4453-97DC-366A6A62A4D4}"/>
+              </a:ext>
+            </a:extLst>
+          </p:cNvPr>
+          <p:cNvSpPr txBox="1">
+            <a:spLocks/>
+          </p:cNvSpPr>
+          <p:nvPr/>
+        </p:nvSpPr>
+        <p:spPr>
+          <a:xfrm>
+            <a:off x="263824" y="5282623"/>
+            <a:ext cx="3842350" cy="1325563"/>
+          </a:xfrm>
+          <a:prstGeom prst="rect">
+            <a:avLst/>
+          </a:prstGeom>
+        </p:spPr>
+        <p:txBody>
+          <a:bodyPr vert="horz" lIns="91440" tIns="45720" rIns="91440" bIns="45720" rtlCol="0" anchor="ctr">
+            <a:normAutofit fontScale="97500" lnSpcReduction="10000"/>
+          </a:bodyPr>
+          <a:lstStyle>
+            <a:lvl1pPr algn="l" defTabSz="914400" rtl="0" eaLnBrk="1" latinLnBrk="0" hangingPunct="1">
+              <a:lnSpc>
+                <a:spcPct val="90000"/>
+              </a:lnSpc>
+              <a:spcBef>
+                <a:spcPct val="0"/>
+              </a:spcBef>
+              <a:buNone/>
+              <a:defRPr sz="4400" kern="1200">
+                <a:solidFill>
+                  <a:schemeClr val="tx1"/>
+                </a:solidFill>
+                <a:latin typeface="+mj-lt"/>
+                <a:ea typeface="+mj-ea"/>
+                <a:cs typeface="+mj-cs"/>
+              </a:defRPr>
+            </a:lvl1pPr>
+          </a:lstStyle>
+          <a:p>
+            <a:r>
+              <a:rPr lang="en-US" sz="2400" dirty="0"/>
+              <a:t>Current solution: do not use current logs and plots</a:t>
+            </a:r>
+          </a:p>
+          <a:p>
+            <a:r>
+              <a:rPr lang="en-US" sz="2400" dirty="0"/>
+              <a:t>Future solution: reimplement logging and plotting.</a:t>
+            </a:r>
+          </a:p>
+        </p:txBody>
+      </p:sp>
     </p:spTree>
     <p:extLst>
       <p:ext uri="{BB962C8B-B14F-4D97-AF65-F5344CB8AC3E}">
         <p14:creationId xmlns:p14="http://schemas.microsoft.com/office/powerpoint/2010/main" val="1358532058"/>
+      </p:ext>
+    </p:extLst>
+  </p:cSld>
+  <p:clrMapOvr>
+    <a:masterClrMapping/>
+  </p:clrMapOvr>
+</p:sld>
+</file>
+
+<file path=ppt/slides/slide9.xml><?xml version="1.0" encoding="utf-8"?>
+<p:sld xmlns:a="http://schemas.openxmlformats.org/drawingml/2006/main" xmlns:r="http://schemas.openxmlformats.org/officeDocument/2006/relationships" xmlns:p="http://schemas.openxmlformats.org/presentationml/2006/main">
+  <p:cSld>
+    <p:spTree>
+      <p:nvGrpSpPr>
+        <p:cNvPr id="1" name=""/>
+        <p:cNvGrpSpPr/>
+        <p:nvPr/>
+      </p:nvGrpSpPr>
+      <p:grpSpPr>
+        <a:xfrm>
+          <a:off x="0" y="0"/>
+          <a:ext cx="0" cy="0"/>
+          <a:chOff x="0" y="0"/>
+          <a:chExt cx="0" cy="0"/>
+        </a:xfrm>
+      </p:grpSpPr>
+      <p:sp>
+        <p:nvSpPr>
+          <p:cNvPr id="4" name="Title 1">
+            <a:extLst>
+              <a:ext uri="{FF2B5EF4-FFF2-40B4-BE49-F238E27FC236}">
+                <a16:creationId xmlns:a16="http://schemas.microsoft.com/office/drawing/2014/main" id="{C724AB56-479D-4973-95BA-A576691B4CBA}"/>
+              </a:ext>
+            </a:extLst>
+          </p:cNvPr>
+          <p:cNvSpPr txBox="1">
+            <a:spLocks/>
+          </p:cNvSpPr>
+          <p:nvPr/>
+        </p:nvSpPr>
+        <p:spPr>
+          <a:xfrm>
+            <a:off x="990600" y="517525"/>
+            <a:ext cx="10515600" cy="1325563"/>
+          </a:xfrm>
+          <a:prstGeom prst="rect">
+            <a:avLst/>
+          </a:prstGeom>
+        </p:spPr>
+        <p:txBody>
+          <a:bodyPr vert="horz" lIns="91440" tIns="45720" rIns="91440" bIns="45720" rtlCol="0" anchor="ctr">
+            <a:normAutofit fontScale="97500"/>
+          </a:bodyPr>
+          <a:lstStyle>
+            <a:lvl1pPr algn="l" defTabSz="914400" rtl="0" eaLnBrk="1" latinLnBrk="0" hangingPunct="1">
+              <a:lnSpc>
+                <a:spcPct val="90000"/>
+              </a:lnSpc>
+              <a:spcBef>
+                <a:spcPct val="0"/>
+              </a:spcBef>
+              <a:buNone/>
+              <a:defRPr sz="4400" kern="1200">
+                <a:solidFill>
+                  <a:schemeClr val="tx1"/>
+                </a:solidFill>
+                <a:latin typeface="+mj-lt"/>
+                <a:ea typeface="+mj-ea"/>
+                <a:cs typeface="+mj-cs"/>
+              </a:defRPr>
+            </a:lvl1pPr>
+          </a:lstStyle>
+          <a:p>
+            <a:r>
+              <a:rPr lang="en-US" sz="2400" dirty="0"/>
+              <a:t>Reproducing issue 6:</a:t>
+            </a:r>
+            <a:br>
+              <a:rPr lang="en-US" sz="2400" dirty="0"/>
+            </a:br>
+            <a:r>
+              <a:rPr lang="en-US" sz="2400" dirty="0"/>
+              <a:t>Go to branch v2.1 commit#: (will be added after commit)</a:t>
+            </a:r>
+          </a:p>
+          <a:p>
+            <a:r>
+              <a:rPr lang="en-US" sz="2400" dirty="0"/>
+              <a:t>Run </a:t>
+            </a:r>
+            <a:r>
+              <a:rPr lang="en-US" sz="2400"/>
+              <a:t>following configuration</a:t>
+            </a:r>
+            <a:endParaRPr lang="en-US" sz="2400" dirty="0"/>
+          </a:p>
+          <a:p>
+            <a:endParaRPr lang="en-US" sz="2400" dirty="0"/>
+          </a:p>
+        </p:txBody>
+      </p:sp>
+      <p:pic>
+        <p:nvPicPr>
+          <p:cNvPr id="5" name="Picture 4">
+            <a:extLst>
+              <a:ext uri="{FF2B5EF4-FFF2-40B4-BE49-F238E27FC236}">
+                <a16:creationId xmlns:a16="http://schemas.microsoft.com/office/drawing/2014/main" id="{8BFD2A75-B433-4576-88F5-1CC960305F84}"/>
+              </a:ext>
+            </a:extLst>
+          </p:cNvPr>
+          <p:cNvPicPr>
+            <a:picLocks noChangeAspect="1"/>
+          </p:cNvPicPr>
+          <p:nvPr/>
+        </p:nvPicPr>
+        <p:blipFill>
+          <a:blip r:embed="rId2"/>
+          <a:stretch>
+            <a:fillRect/>
+          </a:stretch>
+        </p:blipFill>
+        <p:spPr>
+          <a:xfrm>
+            <a:off x="2677514" y="1984075"/>
+            <a:ext cx="5119666" cy="4557353"/>
+          </a:xfrm>
+          <a:prstGeom prst="rect">
+            <a:avLst/>
+          </a:prstGeom>
+        </p:spPr>
+      </p:pic>
+    </p:spTree>
+    <p:extLst>
+      <p:ext uri="{BB962C8B-B14F-4D97-AF65-F5344CB8AC3E}">
+        <p14:creationId xmlns:p14="http://schemas.microsoft.com/office/powerpoint/2010/main" val="456694159"/>
       </p:ext>
     </p:extLst>
   </p:cSld>

</xml_diff>

<commit_message>
Info how to reproduce issue 6
</commit_message>
<xml_diff>
--- a/multiscalemodel/src/edu/usf/ratsim/model/morris_replay/logging/issues.pptx
+++ b/multiscalemodel/src/edu/usf/ratsim/model/morris_replay/logging/issues.pptx
@@ -22158,7 +22158,7 @@
         </p:spPr>
         <p:txBody>
           <a:bodyPr vert="horz" lIns="91440" tIns="45720" rIns="91440" bIns="45720" rtlCol="0" anchor="ctr">
-            <a:normAutofit fontScale="97500"/>
+            <a:normAutofit fontScale="97500" lnSpcReduction="10000"/>
           </a:bodyPr>
           <a:lstStyle>
             <a:lvl1pPr algn="l" defTabSz="914400" rtl="0" eaLnBrk="1" latinLnBrk="0" hangingPunct="1">
@@ -22189,19 +22189,26 @@
             </a:br>
             <a:r>
               <a:rPr lang="en-US" sz="2400" dirty="0"/>
-              <a:t>Go to branch v2.1 commit#: (will be added after commit)</a:t>
+              <a:t>Go to branch v2.1 commit</a:t>
             </a:r>
+            <a:r>
+              <a:rPr lang="en-US" sz="2400"/>
+              <a:t>#: 2fd3db47247e46e1500a200db25eca5cf861346c</a:t>
+            </a:r>
+            <a:br>
+              <a:rPr lang="en-US" sz="2400"/>
+            </a:br>
+            <a:r>
+              <a:rPr lang="en-US" sz="2400"/>
+              <a:t>of date: 07/11/2018</a:t>
+            </a:r>
+            <a:endParaRPr lang="en-US" sz="2400" dirty="0"/>
           </a:p>
           <a:p>
             <a:r>
               <a:rPr lang="en-US" sz="2400" dirty="0"/>
-              <a:t>Run </a:t>
+              <a:t>Run following configuration</a:t>
             </a:r>
-            <a:r>
-              <a:rPr lang="en-US" sz="2400"/>
-              <a:t>following configuration</a:t>
-            </a:r>
-            <a:endParaRPr lang="en-US" sz="2400" dirty="0"/>
           </a:p>
           <a:p>
             <a:endParaRPr lang="en-US" sz="2400" dirty="0"/>

</xml_diff>